<commit_message>
Premier design des cartes à joueur
</commit_message>
<xml_diff>
--- a/pictures/cartes-a-jouer.pptx
+++ b/pictures/cartes-a-jouer.pptx
@@ -5,7 +5,7 @@
     <p:sldMasterId id="2147483648" r:id="rId1"/>
   </p:sldMasterIdLst>
   <p:notesMasterIdLst>
-    <p:notesMasterId r:id="rId10"/>
+    <p:notesMasterId r:id="rId11"/>
   </p:notesMasterIdLst>
   <p:sldIdLst>
     <p:sldId id="256" r:id="rId2"/>
@@ -16,6 +16,7 @@
     <p:sldId id="262" r:id="rId7"/>
     <p:sldId id="263" r:id="rId8"/>
     <p:sldId id="264" r:id="rId9"/>
+    <p:sldId id="265" r:id="rId10"/>
   </p:sldIdLst>
   <p:sldSz cx="12192000" cy="6858000"/>
   <p:notesSz cx="6888163" cy="10020300"/>
@@ -14149,7 +14150,7 @@
         </p:nvGrpSpPr>
         <p:grpSpPr>
           <a:xfrm>
-            <a:off x="8361565" y="666160"/>
+            <a:off x="8218161" y="1133500"/>
             <a:ext cx="2124000" cy="3312000"/>
             <a:chOff x="8320607" y="666160"/>
             <a:chExt cx="2124000" cy="3312000"/>
@@ -14274,7 +14275,7 @@
                   <a:latin typeface="Segoe UI" panose="020B0502040204020203" pitchFamily="34" charset="0"/>
                   <a:cs typeface="Segoe UI" panose="020B0502040204020203" pitchFamily="34" charset="0"/>
                 </a:rPr>
-                <a:t>Déplacer Officier</a:t>
+                <a:t>Déplacer Officier 1</a:t>
               </a:r>
             </a:p>
           </p:txBody>
@@ -14605,7 +14606,7 @@
         </p:nvGrpSpPr>
         <p:grpSpPr>
           <a:xfrm>
-            <a:off x="936187" y="666160"/>
+            <a:off x="1075682" y="1133500"/>
             <a:ext cx="2124000" cy="3312000"/>
             <a:chOff x="964253" y="675992"/>
             <a:chExt cx="2124000" cy="3312000"/>
@@ -14730,7 +14731,7 @@
                   <a:latin typeface="Segoe UI" panose="020B0502040204020203" pitchFamily="34" charset="0"/>
                   <a:cs typeface="Segoe UI" panose="020B0502040204020203" pitchFamily="34" charset="0"/>
                 </a:rPr>
-                <a:t>Déplacer Officier</a:t>
+                <a:t>Déplacer Officier 3+</a:t>
               </a:r>
             </a:p>
           </p:txBody>
@@ -15395,7 +15396,7 @@
         </p:nvGrpSpPr>
         <p:grpSpPr>
           <a:xfrm>
-            <a:off x="3402994" y="666160"/>
+            <a:off x="3403710" y="1133500"/>
             <a:ext cx="2131344" cy="3312000"/>
             <a:chOff x="3407500" y="668808"/>
             <a:chExt cx="2131344" cy="3312000"/>
@@ -15520,7 +15521,7 @@
                   <a:latin typeface="Segoe UI" panose="020B0502040204020203" pitchFamily="34" charset="0"/>
                   <a:cs typeface="Segoe UI" panose="020B0502040204020203" pitchFamily="34" charset="0"/>
                 </a:rPr>
-                <a:t>Déplacer Officier</a:t>
+                <a:t>Déplacer Officier 2+</a:t>
               </a:r>
             </a:p>
           </p:txBody>
@@ -16118,7 +16119,7 @@
         </p:nvGrpSpPr>
         <p:grpSpPr>
           <a:xfrm>
-            <a:off x="5877145" y="666160"/>
+            <a:off x="5775353" y="1134414"/>
             <a:ext cx="2141614" cy="3312000"/>
             <a:chOff x="5790181" y="675992"/>
             <a:chExt cx="2141614" cy="3312000"/>
@@ -16243,7 +16244,7 @@
                   <a:latin typeface="Segoe UI" panose="020B0502040204020203" pitchFamily="34" charset="0"/>
                   <a:cs typeface="Segoe UI" panose="020B0502040204020203" pitchFamily="34" charset="0"/>
                 </a:rPr>
-                <a:t>Déplacer Officier</a:t>
+                <a:t>Déplacer Officier 1+</a:t>
               </a:r>
             </a:p>
           </p:txBody>
@@ -17684,7 +17685,7 @@
                   <a:latin typeface="Segoe UI" panose="020B0502040204020203" pitchFamily="34" charset="0"/>
                   <a:cs typeface="Segoe UI" panose="020B0502040204020203" pitchFamily="34" charset="0"/>
                 </a:rPr>
-                <a:t>Déplacer Officier</a:t>
+                <a:t>Déplacer Officier 1</a:t>
               </a:r>
             </a:p>
           </p:txBody>
@@ -18003,10 +18004,10 @@
       </p:grpSp>
       <p:grpSp>
         <p:nvGrpSpPr>
-          <p:cNvPr id="5" name="Groupe 4">
-            <a:extLst>
-              <a:ext uri="{FF2B5EF4-FFF2-40B4-BE49-F238E27FC236}">
-                <a16:creationId xmlns:a16="http://schemas.microsoft.com/office/drawing/2014/main" id="{EBFEF618-19FB-95E6-7634-6CE31232A89E}"/>
+          <p:cNvPr id="145" name="Groupe 144">
+            <a:extLst>
+              <a:ext uri="{FF2B5EF4-FFF2-40B4-BE49-F238E27FC236}">
+                <a16:creationId xmlns:a16="http://schemas.microsoft.com/office/drawing/2014/main" id="{86D263C5-D2AF-A259-2EAE-99CAC5A2CA30}"/>
               </a:ext>
             </a:extLst>
           </p:cNvPr>
@@ -18015,18 +18016,18 @@
         </p:nvGrpSpPr>
         <p:grpSpPr>
           <a:xfrm>
-            <a:off x="943245" y="848363"/>
-            <a:ext cx="2141614" cy="3312000"/>
-            <a:chOff x="943245" y="400688"/>
-            <a:chExt cx="2141614" cy="3312000"/>
+            <a:off x="850998" y="848363"/>
+            <a:ext cx="2124000" cy="3312000"/>
+            <a:chOff x="9705589" y="685825"/>
+            <a:chExt cx="2124000" cy="3312000"/>
           </a:xfrm>
         </p:grpSpPr>
         <p:sp>
           <p:nvSpPr>
-            <p:cNvPr id="128" name="Rectangle 127">
+            <p:cNvPr id="18" name="Rectangle 17">
               <a:extLst>
                 <a:ext uri="{FF2B5EF4-FFF2-40B4-BE49-F238E27FC236}">
-                  <a16:creationId xmlns:a16="http://schemas.microsoft.com/office/drawing/2014/main" id="{2A3DAB77-6D93-D89F-79CE-122A5B5BA56C}"/>
+                  <a16:creationId xmlns:a16="http://schemas.microsoft.com/office/drawing/2014/main" id="{A435FD56-AD76-3DD4-D746-06F20E32E5FA}"/>
                 </a:ext>
               </a:extLst>
             </p:cNvPr>
@@ -18035,7 +18036,7 @@
           </p:nvSpPr>
           <p:spPr>
             <a:xfrm>
-              <a:off x="943245" y="400688"/>
+              <a:off x="9705589" y="685825"/>
               <a:ext cx="2124000" cy="3312000"/>
             </a:xfrm>
             <a:prstGeom prst="rect">
@@ -18076,10 +18077,10 @@
         </p:sp>
         <p:sp>
           <p:nvSpPr>
-            <p:cNvPr id="129" name="Rectangle 128">
+            <p:cNvPr id="20" name="Rectangle 19">
               <a:extLst>
                 <a:ext uri="{FF2B5EF4-FFF2-40B4-BE49-F238E27FC236}">
-                  <a16:creationId xmlns:a16="http://schemas.microsoft.com/office/drawing/2014/main" id="{F3E9C2E3-D509-4A78-0A02-CE28DD63FDE2}"/>
+                  <a16:creationId xmlns:a16="http://schemas.microsoft.com/office/drawing/2014/main" id="{75293A27-08B1-1D1A-FE08-FFEAB64573C8}"/>
                 </a:ext>
               </a:extLst>
             </p:cNvPr>
@@ -18088,7 +18089,7 @@
           </p:nvSpPr>
           <p:spPr>
             <a:xfrm>
-              <a:off x="943245" y="400688"/>
+              <a:off x="9705589" y="685825"/>
               <a:ext cx="2124000" cy="432000"/>
             </a:xfrm>
             <a:prstGeom prst="rect">
@@ -18128,7 +18129,7 @@
             </a:fontRef>
           </p:style>
           <p:txBody>
-            <a:bodyPr rtlCol="0" anchor="ctr"/>
+            <a:bodyPr lIns="0" rIns="0" rtlCol="0" anchor="ctr"/>
             <a:lstStyle/>
             <a:p>
               <a:pPr algn="ctr"/>
@@ -18140,17 +18141,17 @@
                   <a:latin typeface="Segoe UI" panose="020B0502040204020203" pitchFamily="34" charset="0"/>
                   <a:cs typeface="Segoe UI" panose="020B0502040204020203" pitchFamily="34" charset="0"/>
                 </a:rPr>
-                <a:t>Déplacer Officier</a:t>
+                <a:t>Chevauchée lointaine</a:t>
               </a:r>
             </a:p>
           </p:txBody>
         </p:sp>
         <p:sp>
           <p:nvSpPr>
-            <p:cNvPr id="136" name="Cercle : creux 135">
+            <p:cNvPr id="21" name="Cercle : creux 20">
               <a:extLst>
                 <a:ext uri="{FF2B5EF4-FFF2-40B4-BE49-F238E27FC236}">
-                  <a16:creationId xmlns:a16="http://schemas.microsoft.com/office/drawing/2014/main" id="{3237A24C-1FEF-6314-61E7-E413DF056965}"/>
+                  <a16:creationId xmlns:a16="http://schemas.microsoft.com/office/drawing/2014/main" id="{3B7472A6-26E3-22B1-3D95-2C25E0B19835}"/>
                 </a:ext>
               </a:extLst>
             </p:cNvPr>
@@ -18159,7 +18160,7 @@
           </p:nvSpPr>
           <p:spPr>
             <a:xfrm>
-              <a:off x="1023987" y="3231446"/>
+              <a:off x="9786331" y="3516583"/>
               <a:ext cx="360000" cy="360000"/>
             </a:xfrm>
             <a:prstGeom prst="donut">
@@ -18209,10 +18210,10 @@
         </p:sp>
         <p:sp>
           <p:nvSpPr>
-            <p:cNvPr id="138" name="ZoneTexte 137">
+            <p:cNvPr id="23" name="ZoneTexte 22">
               <a:extLst>
                 <a:ext uri="{FF2B5EF4-FFF2-40B4-BE49-F238E27FC236}">
-                  <a16:creationId xmlns:a16="http://schemas.microsoft.com/office/drawing/2014/main" id="{4DB423C5-628F-F9E0-EB85-E7B972A8844E}"/>
+                  <a16:creationId xmlns:a16="http://schemas.microsoft.com/office/drawing/2014/main" id="{70B2D6D9-AF5C-1149-7B7D-B10340079AB4}"/>
                 </a:ext>
               </a:extLst>
             </p:cNvPr>
@@ -18221,8 +18222,8 @@
           </p:nvSpPr>
           <p:spPr>
             <a:xfrm>
-              <a:off x="1512768" y="3142102"/>
-              <a:ext cx="616465" cy="369332"/>
+              <a:off x="9807874" y="1220565"/>
+              <a:ext cx="1919430" cy="646331"/>
             </a:xfrm>
             <a:prstGeom prst="rect">
               <a:avLst/>
@@ -18235,74 +18236,27 @@
             </a:bodyPr>
             <a:lstStyle/>
             <a:p>
+              <a:pPr algn="just">
+                <a:spcAft>
+                  <a:spcPts val="600"/>
+                </a:spcAft>
+              </a:pPr>
               <a:r>
-                <a:rPr lang="fr-FR" b="1" dirty="0">
+                <a:rPr lang="fr-FR" sz="1200" b="1" dirty="0">
                   <a:latin typeface="Segoe UI" panose="020B0502040204020203" pitchFamily="34" charset="0"/>
                   <a:cs typeface="Segoe UI" panose="020B0502040204020203" pitchFamily="34" charset="0"/>
                 </a:rPr>
-                <a:t>T2 :</a:t>
+                <a:t>Déplacer un baron ou un chevalier d’autant de tuiles que vous voulez</a:t>
               </a:r>
             </a:p>
           </p:txBody>
         </p:sp>
         <p:sp>
           <p:nvSpPr>
-            <p:cNvPr id="139" name="Signe Plus 138">
+            <p:cNvPr id="37" name="Hexagone 36">
               <a:extLst>
                 <a:ext uri="{FF2B5EF4-FFF2-40B4-BE49-F238E27FC236}">
-                  <a16:creationId xmlns:a16="http://schemas.microsoft.com/office/drawing/2014/main" id="{1121FB81-87DB-7435-99A1-7C76E0EAF2B4}"/>
-                </a:ext>
-              </a:extLst>
-            </p:cNvPr>
-            <p:cNvSpPr/>
-            <p:nvPr/>
-          </p:nvSpPr>
-          <p:spPr>
-            <a:xfrm>
-              <a:off x="2025785" y="3203833"/>
-              <a:ext cx="252000" cy="252000"/>
-            </a:xfrm>
-            <a:prstGeom prst="mathPlus">
-              <a:avLst/>
-            </a:prstGeom>
-            <a:solidFill>
-              <a:schemeClr val="tx1"/>
-            </a:solidFill>
-            <a:ln>
-              <a:noFill/>
-            </a:ln>
-          </p:spPr>
-          <p:style>
-            <a:lnRef idx="2">
-              <a:schemeClr val="accent1">
-                <a:shade val="15000"/>
-              </a:schemeClr>
-            </a:lnRef>
-            <a:fillRef idx="1">
-              <a:schemeClr val="accent1"/>
-            </a:fillRef>
-            <a:effectRef idx="0">
-              <a:schemeClr val="accent1"/>
-            </a:effectRef>
-            <a:fontRef idx="minor">
-              <a:schemeClr val="lt1"/>
-            </a:fontRef>
-          </p:style>
-          <p:txBody>
-            <a:bodyPr rtlCol="0" anchor="ctr"/>
-            <a:lstStyle/>
-            <a:p>
-              <a:pPr algn="ctr"/>
-              <a:endParaRPr lang="fr-FR"/>
-            </a:p>
-          </p:txBody>
-        </p:sp>
-        <p:sp>
-          <p:nvSpPr>
-            <p:cNvPr id="140" name="Hexagone 139">
-              <a:extLst>
-                <a:ext uri="{FF2B5EF4-FFF2-40B4-BE49-F238E27FC236}">
-                  <a16:creationId xmlns:a16="http://schemas.microsoft.com/office/drawing/2014/main" id="{360BD776-D808-0B51-BA01-E38C8B6EBE39}"/>
+                  <a16:creationId xmlns:a16="http://schemas.microsoft.com/office/drawing/2014/main" id="{68F94FF1-D365-0A93-6353-EE0C13615245}"/>
                 </a:ext>
               </a:extLst>
             </p:cNvPr>
@@ -18311,7 +18265,7 @@
           </p:nvSpPr>
           <p:spPr>
             <a:xfrm rot="5400000">
-              <a:off x="2366821" y="2633792"/>
+              <a:off x="11167559" y="3506970"/>
               <a:ext cx="396000" cy="360000"/>
             </a:xfrm>
             <a:prstGeom prst="hexagon">
@@ -18366,10 +18320,10 @@
         </p:sp>
         <p:sp>
           <p:nvSpPr>
-            <p:cNvPr id="141" name="Hexagone 140">
+            <p:cNvPr id="25" name="Hexagone 24">
               <a:extLst>
                 <a:ext uri="{FF2B5EF4-FFF2-40B4-BE49-F238E27FC236}">
-                  <a16:creationId xmlns:a16="http://schemas.microsoft.com/office/drawing/2014/main" id="{DF6BA45E-1766-A5FA-9CD6-69DB85AD125D}"/>
+                  <a16:creationId xmlns:a16="http://schemas.microsoft.com/office/drawing/2014/main" id="{5431748B-775D-DAAD-2282-30F0BCA6E22E}"/>
                 </a:ext>
               </a:extLst>
             </p:cNvPr>
@@ -18378,141 +18332,7 @@
           </p:nvSpPr>
           <p:spPr>
             <a:xfrm rot="5400000">
-              <a:off x="1957546" y="2633792"/>
-              <a:ext cx="396000" cy="360000"/>
-            </a:xfrm>
-            <a:prstGeom prst="hexagon">
-              <a:avLst/>
-            </a:prstGeom>
-            <a:blipFill>
-              <a:blip r:embed="rId11">
-                <a:extLst>
-                  <a:ext uri="{BEBA8EAE-BF5A-486C-A8C5-ECC9F3942E4B}">
-                    <a14:imgProps xmlns:a14="http://schemas.microsoft.com/office/drawing/2010/main">
-                      <a14:imgLayer r:embed="rId12">
-                        <a14:imgEffect>
-                          <a14:brightnessContrast bright="-20000" contrast="-40000"/>
-                        </a14:imgEffect>
-                      </a14:imgLayer>
-                    </a14:imgProps>
-                  </a:ext>
-                </a:extLst>
-              </a:blip>
-              <a:tile tx="0" ty="0" sx="100000" sy="100000" flip="none" algn="tl"/>
-            </a:blipFill>
-            <a:ln w="12700">
-              <a:solidFill>
-                <a:schemeClr val="tx1"/>
-              </a:solidFill>
-            </a:ln>
-          </p:spPr>
-          <p:style>
-            <a:lnRef idx="2">
-              <a:schemeClr val="accent1">
-                <a:shade val="15000"/>
-              </a:schemeClr>
-            </a:lnRef>
-            <a:fillRef idx="1">
-              <a:schemeClr val="accent1"/>
-            </a:fillRef>
-            <a:effectRef idx="0">
-              <a:schemeClr val="accent1"/>
-            </a:effectRef>
-            <a:fontRef idx="minor">
-              <a:schemeClr val="lt1"/>
-            </a:fontRef>
-          </p:style>
-          <p:txBody>
-            <a:bodyPr rtlCol="0" anchor="ctr"/>
-            <a:lstStyle/>
-            <a:p>
-              <a:pPr algn="ctr"/>
-              <a:endParaRPr lang="fr-FR"/>
-            </a:p>
-          </p:txBody>
-        </p:sp>
-        <p:sp>
-          <p:nvSpPr>
-            <p:cNvPr id="142" name="Hexagone 141">
-              <a:extLst>
-                <a:ext uri="{FF2B5EF4-FFF2-40B4-BE49-F238E27FC236}">
-                  <a16:creationId xmlns:a16="http://schemas.microsoft.com/office/drawing/2014/main" id="{1BDE6D39-88CC-7F8A-2DD0-FC6C8373EF27}"/>
-                </a:ext>
-              </a:extLst>
-            </p:cNvPr>
-            <p:cNvSpPr/>
-            <p:nvPr/>
-          </p:nvSpPr>
-          <p:spPr>
-            <a:xfrm rot="5400000">
-              <a:off x="1548271" y="2643725"/>
-              <a:ext cx="396000" cy="360000"/>
-            </a:xfrm>
-            <a:prstGeom prst="hexagon">
-              <a:avLst/>
-            </a:prstGeom>
-            <a:blipFill>
-              <a:blip r:embed="rId11">
-                <a:extLst>
-                  <a:ext uri="{BEBA8EAE-BF5A-486C-A8C5-ECC9F3942E4B}">
-                    <a14:imgProps xmlns:a14="http://schemas.microsoft.com/office/drawing/2010/main">
-                      <a14:imgLayer r:embed="rId12">
-                        <a14:imgEffect>
-                          <a14:brightnessContrast bright="-20000" contrast="-40000"/>
-                        </a14:imgEffect>
-                      </a14:imgLayer>
-                    </a14:imgProps>
-                  </a:ext>
-                </a:extLst>
-              </a:blip>
-              <a:tile tx="0" ty="0" sx="100000" sy="100000" flip="none" algn="tl"/>
-            </a:blipFill>
-            <a:ln w="12700">
-              <a:solidFill>
-                <a:schemeClr val="tx1"/>
-              </a:solidFill>
-            </a:ln>
-          </p:spPr>
-          <p:style>
-            <a:lnRef idx="2">
-              <a:schemeClr val="accent1">
-                <a:shade val="15000"/>
-              </a:schemeClr>
-            </a:lnRef>
-            <a:fillRef idx="1">
-              <a:schemeClr val="accent1"/>
-            </a:fillRef>
-            <a:effectRef idx="0">
-              <a:schemeClr val="accent1"/>
-            </a:effectRef>
-            <a:fontRef idx="minor">
-              <a:schemeClr val="lt1"/>
-            </a:fontRef>
-          </p:style>
-          <p:txBody>
-            <a:bodyPr rtlCol="0" anchor="ctr"/>
-            <a:lstStyle/>
-            <a:p>
-              <a:pPr algn="ctr"/>
-              <a:endParaRPr lang="fr-FR"/>
-            </a:p>
-          </p:txBody>
-        </p:sp>
-        <p:sp>
-          <p:nvSpPr>
-            <p:cNvPr id="143" name="Hexagone 142">
-              <a:extLst>
-                <a:ext uri="{FF2B5EF4-FFF2-40B4-BE49-F238E27FC236}">
-                  <a16:creationId xmlns:a16="http://schemas.microsoft.com/office/drawing/2014/main" id="{A854B9D2-6218-2778-24A5-E3B418293C2A}"/>
-                </a:ext>
-              </a:extLst>
-            </p:cNvPr>
-            <p:cNvSpPr/>
-            <p:nvPr/>
-          </p:nvSpPr>
-          <p:spPr>
-            <a:xfrm rot="5400000">
-              <a:off x="1134768" y="2643725"/>
+              <a:off x="10349009" y="3505445"/>
               <a:ext cx="396000" cy="360000"/>
             </a:xfrm>
             <a:prstGeom prst="hexagon">
@@ -18552,79 +18372,12 @@
             </a:p>
           </p:txBody>
         </p:sp>
-        <p:sp>
-          <p:nvSpPr>
-            <p:cNvPr id="146" name="Hexagone 145">
+        <p:cxnSp>
+          <p:nvCxnSpPr>
+            <p:cNvPr id="29" name="Connecteur droit avec flèche 28">
               <a:extLst>
                 <a:ext uri="{FF2B5EF4-FFF2-40B4-BE49-F238E27FC236}">
-                  <a16:creationId xmlns:a16="http://schemas.microsoft.com/office/drawing/2014/main" id="{DB92BB15-F2C8-7A54-73D2-A5AEA3AB3A1F}"/>
-                </a:ext>
-              </a:extLst>
-            </p:cNvPr>
-            <p:cNvSpPr/>
-            <p:nvPr/>
-          </p:nvSpPr>
-          <p:spPr>
-            <a:xfrm rot="5400000">
-              <a:off x="2362895" y="3160102"/>
-              <a:ext cx="396000" cy="360000"/>
-            </a:xfrm>
-            <a:prstGeom prst="hexagon">
-              <a:avLst/>
-            </a:prstGeom>
-            <a:blipFill>
-              <a:blip r:embed="rId11">
-                <a:extLst>
-                  <a:ext uri="{BEBA8EAE-BF5A-486C-A8C5-ECC9F3942E4B}">
-                    <a14:imgProps xmlns:a14="http://schemas.microsoft.com/office/drawing/2010/main">
-                      <a14:imgLayer r:embed="rId12">
-                        <a14:imgEffect>
-                          <a14:brightnessContrast bright="-20000" contrast="-40000"/>
-                        </a14:imgEffect>
-                      </a14:imgLayer>
-                    </a14:imgProps>
-                  </a:ext>
-                </a:extLst>
-              </a:blip>
-              <a:tile tx="0" ty="0" sx="100000" sy="100000" flip="none" algn="tl"/>
-            </a:blipFill>
-            <a:ln w="12700">
-              <a:solidFill>
-                <a:schemeClr val="tx1"/>
-              </a:solidFill>
-            </a:ln>
-          </p:spPr>
-          <p:style>
-            <a:lnRef idx="2">
-              <a:schemeClr val="accent1">
-                <a:shade val="15000"/>
-              </a:schemeClr>
-            </a:lnRef>
-            <a:fillRef idx="1">
-              <a:schemeClr val="accent1"/>
-            </a:fillRef>
-            <a:effectRef idx="0">
-              <a:schemeClr val="accent1"/>
-            </a:effectRef>
-            <a:fontRef idx="minor">
-              <a:schemeClr val="lt1"/>
-            </a:fontRef>
-          </p:style>
-          <p:txBody>
-            <a:bodyPr rtlCol="0" anchor="ctr"/>
-            <a:lstStyle/>
-            <a:p>
-              <a:pPr algn="ctr"/>
-              <a:endParaRPr lang="fr-FR"/>
-            </a:p>
-          </p:txBody>
-        </p:sp>
-        <p:cxnSp>
-          <p:nvCxnSpPr>
-            <p:cNvPr id="161" name="Connecteur droit avec flèche 160">
-              <a:extLst>
-                <a:ext uri="{FF2B5EF4-FFF2-40B4-BE49-F238E27FC236}">
-                  <a16:creationId xmlns:a16="http://schemas.microsoft.com/office/drawing/2014/main" id="{419695C3-3605-9710-82FA-B2A99C5639F6}"/>
+                  <a16:creationId xmlns:a16="http://schemas.microsoft.com/office/drawing/2014/main" id="{CF45E471-EEF5-1B1D-6185-4EEC0112EAF2}"/>
                 </a:ext>
               </a:extLst>
             </p:cNvPr>
@@ -18634,9 +18387,9 @@
             <p:nvPr/>
           </p:nvCxnSpPr>
           <p:spPr>
-            <a:xfrm>
-              <a:off x="1352668" y="2817766"/>
-              <a:ext cx="1269309" cy="0"/>
+            <a:xfrm flipV="1">
+              <a:off x="10547009" y="3690944"/>
+              <a:ext cx="875706" cy="3210"/>
             </a:xfrm>
             <a:prstGeom prst="straightConnector1">
               <a:avLst/>
@@ -18660,55 +18413,12 @@
             </a:fontRef>
           </p:style>
         </p:cxnSp>
-        <p:sp>
-          <p:nvSpPr>
-            <p:cNvPr id="24" name="ZoneTexte 23">
+        <p:pic>
+          <p:nvPicPr>
+            <p:cNvPr id="50" name="Image 49" descr="Une image contenant peinture, dessin, Fournitures pour cheval, Rêne&#10;&#10;Le contenu généré par l’IA peut être incorrect.">
               <a:extLst>
                 <a:ext uri="{FF2B5EF4-FFF2-40B4-BE49-F238E27FC236}">
-                  <a16:creationId xmlns:a16="http://schemas.microsoft.com/office/drawing/2014/main" id="{09073A57-4DBE-D798-9FF8-90DBCA070488}"/>
-                </a:ext>
-              </a:extLst>
-            </p:cNvPr>
-            <p:cNvSpPr txBox="1"/>
-            <p:nvPr/>
-          </p:nvSpPr>
-          <p:spPr>
-            <a:xfrm>
-              <a:off x="995876" y="916577"/>
-              <a:ext cx="2007000" cy="461665"/>
-            </a:xfrm>
-            <a:prstGeom prst="rect">
-              <a:avLst/>
-            </a:prstGeom>
-            <a:noFill/>
-          </p:spPr>
-          <p:txBody>
-            <a:bodyPr wrap="square" rtlCol="0">
-              <a:spAutoFit/>
-            </a:bodyPr>
-            <a:lstStyle/>
-            <a:p>
-              <a:pPr algn="just">
-                <a:spcAft>
-                  <a:spcPts val="600"/>
-                </a:spcAft>
-              </a:pPr>
-              <a:r>
-                <a:rPr lang="fr-FR" sz="1200" b="1" dirty="0">
-                  <a:latin typeface="Segoe UI" panose="020B0502040204020203" pitchFamily="34" charset="0"/>
-                  <a:cs typeface="Segoe UI" panose="020B0502040204020203" pitchFamily="34" charset="0"/>
-                </a:rPr>
-                <a:t>Déplacer un baron ou un chevalier de 3 tuiles</a:t>
-              </a:r>
-            </a:p>
-          </p:txBody>
-        </p:sp>
-        <p:pic>
-          <p:nvPicPr>
-            <p:cNvPr id="27" name="Image 26" descr="Une image contenant cheval, croquis, dessin, jument&#10;&#10;Le contenu généré par l’IA peut être incorrect.">
-              <a:extLst>
-                <a:ext uri="{FF2B5EF4-FFF2-40B4-BE49-F238E27FC236}">
-                  <a16:creationId xmlns:a16="http://schemas.microsoft.com/office/drawing/2014/main" id="{395B4F53-345D-DA6E-1315-C8D49CD801D5}"/>
+                  <a16:creationId xmlns:a16="http://schemas.microsoft.com/office/drawing/2014/main" id="{7D24BD9B-31DA-FF9E-6C5E-8B2C640016FC}"/>
                 </a:ext>
               </a:extLst>
             </p:cNvPr>
@@ -18718,7 +18428,7 @@
             <p:nvPr/>
           </p:nvPicPr>
           <p:blipFill>
-            <a:blip r:embed="rId13">
+            <a:blip r:embed="rId14">
               <a:duotone>
                 <a:prstClr val="black"/>
                 <a:srgbClr val="ECF3C9">
@@ -18727,69 +18437,89 @@
                 </a:srgbClr>
               </a:duotone>
               <a:extLst>
+                <a:ext uri="{BEBA8EAE-BF5A-486C-A8C5-ECC9F3942E4B}">
+                  <a14:imgProps xmlns:a14="http://schemas.microsoft.com/office/drawing/2010/main">
+                    <a14:imgLayer r:embed="rId15">
+                      <a14:imgEffect>
+                        <a14:backgroundRemoval t="10000" b="90000" l="10000" r="90000">
+                          <a14:foregroundMark x1="51367" y1="73438" x2="51563" y2="73535"/>
+                          <a14:foregroundMark x1="51074" y1="74414" x2="51367" y2="74316"/>
+                          <a14:foregroundMark x1="50879" y1="74512" x2="50977" y2="74512"/>
+                          <a14:foregroundMark x1="50684" y1="75000" x2="50293" y2="75098"/>
+                          <a14:foregroundMark x1="50293" y1="73340" x2="50977" y2="73438"/>
+                          <a14:backgroundMark x1="10547" y1="41699" x2="20801" y2="33301"/>
+                          <a14:backgroundMark x1="20801" y1="33301" x2="35156" y2="40137"/>
+                          <a14:backgroundMark x1="35156" y1="40137" x2="42676" y2="46875"/>
+                          <a14:backgroundMark x1="42676" y1="46875" x2="42969" y2="75000"/>
+                          <a14:backgroundMark x1="42969" y1="75000" x2="46680" y2="83008"/>
+                          <a14:backgroundMark x1="46680" y1="83008" x2="25293" y2="88965"/>
+                          <a14:backgroundMark x1="25293" y1="88965" x2="10547" y2="76660"/>
+                          <a14:backgroundMark x1="10547" y1="76660" x2="8789" y2="43359"/>
+                          <a14:backgroundMark x1="8789" y1="43359" x2="12402" y2="41113"/>
+                          <a14:backgroundMark x1="78516" y1="44043" x2="80957" y2="51074"/>
+                          <a14:backgroundMark x1="80957" y1="51074" x2="88867" y2="51855"/>
+                          <a14:backgroundMark x1="88867" y1="51855" x2="93457" y2="43750"/>
+                          <a14:backgroundMark x1="93457" y1="43750" x2="82520" y2="41602"/>
+                          <a14:backgroundMark x1="82520" y1="41602" x2="78418" y2="44141"/>
+                          <a14:backgroundMark x1="47949" y1="64063" x2="50684" y2="72070"/>
+                          <a14:backgroundMark x1="50099" y1="74840" x2="49219" y2="79004"/>
+                          <a14:backgroundMark x1="50684" y1="72070" x2="50200" y2="74360"/>
+                          <a14:backgroundMark x1="49219" y1="79004" x2="54590" y2="73145"/>
+                          <a14:backgroundMark x1="54590" y1="73145" x2="53418" y2="66211"/>
+                          <a14:backgroundMark x1="46387" y1="80566" x2="59863" y2="78906"/>
+                          <a14:backgroundMark x1="59863" y1="78906" x2="60449" y2="67285"/>
+                          <a14:backgroundMark x1="60449" y1="67285" x2="57910" y2="59961"/>
+                          <a14:backgroundMark x1="57910" y1="59961" x2="57910" y2="59766"/>
+                          <a14:backgroundMark x1="61230" y1="68066" x2="68066" y2="73633"/>
+                          <a14:backgroundMark x1="68066" y1="73633" x2="65234" y2="86914"/>
+                          <a14:backgroundMark x1="65234" y1="86914" x2="51660" y2="89844"/>
+                          <a14:backgroundMark x1="51660" y1="89844" x2="44629" y2="87500"/>
+                          <a14:backgroundMark x1="44629" y1="87500" x2="52539" y2="80273"/>
+                          <a14:backgroundMark x1="52539" y1="80273" x2="59473" y2="78809"/>
+                          <a14:backgroundMark x1="59473" y1="78809" x2="62402" y2="70410"/>
+                          <a14:backgroundMark x1="62402" y1="70410" x2="61914" y2="68652"/>
+                          <a14:backgroundMark x1="73047" y1="67773" x2="73047" y2="70508"/>
+                          <a14:backgroundMark x1="73242" y1="74023" x2="73242" y2="74023"/>
+                          <a14:backgroundMark x1="79004" y1="66113" x2="77051" y2="85547"/>
+                          <a14:backgroundMark x1="85254" y1="60742" x2="88184" y2="76953"/>
+                          <a14:backgroundMark x1="88184" y1="76953" x2="80273" y2="77832"/>
+                          <a14:backgroundMark x1="80273" y1="77832" x2="87305" y2="65918"/>
+                          <a14:backgroundMark x1="67480" y1="15918" x2="67480" y2="15918"/>
+                          <a14:backgroundMark x1="87988" y1="59082" x2="87988" y2="59082"/>
+                          <a14:backgroundMark x1="84375" y1="58594" x2="84375" y2="58594"/>
+                          <a14:backgroundMark x1="83594" y1="58105" x2="83594" y2="58105"/>
+                          <a14:backgroundMark x1="85742" y1="57910" x2="85742" y2="57910"/>
+                          <a14:backgroundMark x1="86914" y1="55859" x2="86914" y2="55859"/>
+                          <a14:backgroundMark x1="45410" y1="36816" x2="45410" y2="36816"/>
+                          <a14:backgroundMark x1="46387" y1="35059" x2="46387" y2="35059"/>
+                        </a14:backgroundRemoval>
+                      </a14:imgEffect>
+                      <a14:imgEffect>
+                        <a14:brightnessContrast bright="40000" contrast="-40000"/>
+                      </a14:imgEffect>
+                    </a14:imgLayer>
+                  </a14:imgProps>
+                </a:ext>
                 <a:ext uri="{28A0092B-C50C-407E-A947-70E740481C1C}">
                   <a14:useLocalDpi xmlns:a14="http://schemas.microsoft.com/office/drawing/2010/main" val="0"/>
                 </a:ext>
               </a:extLst>
             </a:blip>
-            <a:srcRect l="35125" t="15464" r="18993" b="44773"/>
+            <a:srcRect l="39260" t="12963" r="9752" b="49602"/>
             <a:stretch>
               <a:fillRect/>
             </a:stretch>
           </p:blipFill>
           <p:spPr>
-            <a:xfrm>
-              <a:off x="1023987" y="1436630"/>
-              <a:ext cx="1133030" cy="981962"/>
+            <a:xfrm flipH="1">
+              <a:off x="9936440" y="2000965"/>
+              <a:ext cx="1564884" cy="1148912"/>
             </a:xfrm>
             <a:prstGeom prst="rect">
               <a:avLst/>
             </a:prstGeom>
           </p:spPr>
         </p:pic>
-        <p:sp>
-          <p:nvSpPr>
-            <p:cNvPr id="28" name="ZoneTexte 27">
-              <a:extLst>
-                <a:ext uri="{FF2B5EF4-FFF2-40B4-BE49-F238E27FC236}">
-                  <a16:creationId xmlns:a16="http://schemas.microsoft.com/office/drawing/2014/main" id="{6D3291D0-5C58-000F-038F-5BF6E3D6484D}"/>
-                </a:ext>
-              </a:extLst>
-            </p:cNvPr>
-            <p:cNvSpPr txBox="1"/>
-            <p:nvPr/>
-          </p:nvSpPr>
-          <p:spPr>
-            <a:xfrm>
-              <a:off x="2122424" y="1437961"/>
-              <a:ext cx="962435" cy="1015663"/>
-            </a:xfrm>
-            <a:prstGeom prst="rect">
-              <a:avLst/>
-            </a:prstGeom>
-            <a:noFill/>
-          </p:spPr>
-          <p:txBody>
-            <a:bodyPr wrap="square" rtlCol="0">
-              <a:spAutoFit/>
-            </a:bodyPr>
-            <a:lstStyle/>
-            <a:p>
-              <a:pPr>
-                <a:spcAft>
-                  <a:spcPts val="600"/>
-                </a:spcAft>
-              </a:pPr>
-              <a:r>
-                <a:rPr lang="fr-FR" sz="1200" b="1" dirty="0">
-                  <a:latin typeface="Segoe UI" panose="020B0502040204020203" pitchFamily="34" charset="0"/>
-                  <a:cs typeface="Segoe UI" panose="020B0502040204020203" pitchFamily="34" charset="0"/>
-                </a:rPr>
-                <a:t>Plus une tuile en partant d’une « tuile 2 »</a:t>
-              </a:r>
-            </a:p>
-          </p:txBody>
-        </p:sp>
       </p:grpSp>
     </p:spTree>
     <p:extLst>
@@ -19034,7 +18764,7 @@
                   <a:latin typeface="Segoe UI" panose="020B0502040204020203" pitchFamily="34" charset="0"/>
                   <a:cs typeface="Segoe UI" panose="020B0502040204020203" pitchFamily="34" charset="0"/>
                 </a:rPr>
-                <a:t>Recruter Troupes</a:t>
+                <a:t>Recruter Troupes 1</a:t>
               </a:r>
             </a:p>
           </p:txBody>
@@ -19480,7 +19210,7 @@
                   <a:latin typeface="Segoe UI" panose="020B0502040204020203" pitchFamily="34" charset="0"/>
                   <a:cs typeface="Segoe UI" panose="020B0502040204020203" pitchFamily="34" charset="0"/>
                 </a:rPr>
-                <a:t>Recruter Troupes</a:t>
+                <a:t>Recruter Troupes 3+</a:t>
               </a:r>
             </a:p>
           </p:txBody>
@@ -20225,7 +19955,7 @@
                   <a:latin typeface="Segoe UI" panose="020B0502040204020203" pitchFamily="34" charset="0"/>
                   <a:cs typeface="Segoe UI" panose="020B0502040204020203" pitchFamily="34" charset="0"/>
                 </a:rPr>
-                <a:t>Recruter Troupes</a:t>
+                <a:t>Recruter Troupes 2+</a:t>
               </a:r>
             </a:p>
           </p:txBody>
@@ -20915,7 +20645,7 @@
                   <a:latin typeface="Segoe UI" panose="020B0502040204020203" pitchFamily="34" charset="0"/>
                   <a:cs typeface="Segoe UI" panose="020B0502040204020203" pitchFamily="34" charset="0"/>
                 </a:rPr>
-                <a:t>Recruter Troupes</a:t>
+                <a:t>Recruter Troupes 1+</a:t>
               </a:r>
             </a:p>
           </p:txBody>
@@ -21515,7 +21245,7 @@
         </p:nvGrpSpPr>
         <p:grpSpPr>
           <a:xfrm>
-            <a:off x="3616621" y="649660"/>
+            <a:off x="6279685" y="670670"/>
             <a:ext cx="2124000" cy="3312000"/>
             <a:chOff x="3353723" y="449635"/>
             <a:chExt cx="2124000" cy="3312000"/>
@@ -22244,7 +21974,7 @@
         </p:nvGrpSpPr>
         <p:grpSpPr>
           <a:xfrm>
-            <a:off x="6182380" y="649660"/>
+            <a:off x="8843182" y="670670"/>
             <a:ext cx="2124000" cy="3312000"/>
             <a:chOff x="5936273" y="452504"/>
             <a:chExt cx="2124000" cy="3312000"/>
@@ -22989,10 +22719,10 @@
       </p:grpSp>
       <p:grpSp>
         <p:nvGrpSpPr>
-          <p:cNvPr id="12" name="Groupe 11">
-            <a:extLst>
-              <a:ext uri="{FF2B5EF4-FFF2-40B4-BE49-F238E27FC236}">
-                <a16:creationId xmlns:a16="http://schemas.microsoft.com/office/drawing/2014/main" id="{B8A9AA0D-BCA6-8BCF-E98E-50D5DF34C121}"/>
+          <p:cNvPr id="7" name="Groupe 6">
+            <a:extLst>
+              <a:ext uri="{FF2B5EF4-FFF2-40B4-BE49-F238E27FC236}">
+                <a16:creationId xmlns:a16="http://schemas.microsoft.com/office/drawing/2014/main" id="{2EE1D52C-CCCE-8617-DDEA-953C426081F6}"/>
               </a:ext>
             </a:extLst>
           </p:cNvPr>
@@ -23001,9 +22731,9 @@
         </p:nvGrpSpPr>
         <p:grpSpPr>
           <a:xfrm>
-            <a:off x="8748139" y="649660"/>
+            <a:off x="3692131" y="670670"/>
             <a:ext cx="2124000" cy="3312000"/>
-            <a:chOff x="8490964" y="452504"/>
+            <a:chOff x="3692131" y="670670"/>
             <a:chExt cx="2124000" cy="3312000"/>
           </a:xfrm>
         </p:grpSpPr>
@@ -23021,7 +22751,7 @@
           </p:nvSpPr>
           <p:spPr>
             <a:xfrm>
-              <a:off x="8490964" y="452504"/>
+              <a:off x="3692131" y="670670"/>
               <a:ext cx="2124000" cy="3312000"/>
             </a:xfrm>
             <a:prstGeom prst="rect">
@@ -23074,7 +22804,7 @@
           </p:nvSpPr>
           <p:spPr>
             <a:xfrm>
-              <a:off x="8490964" y="452504"/>
+              <a:off x="3692131" y="670670"/>
               <a:ext cx="2124000" cy="432000"/>
             </a:xfrm>
             <a:prstGeom prst="rect">
@@ -23121,12 +22851,12 @@
             </a:fontRef>
           </p:style>
           <p:txBody>
-            <a:bodyPr rtlCol="0" anchor="ctr"/>
+            <a:bodyPr lIns="0" rIns="0" rtlCol="0" anchor="ctr"/>
             <a:lstStyle/>
             <a:p>
               <a:pPr algn="ctr"/>
               <a:r>
-                <a:rPr lang="fr-FR" sz="1400" b="1" dirty="0">
+                <a:rPr lang="fr-FR" sz="1600" b="1" dirty="0">
                   <a:solidFill>
                     <a:schemeClr val="bg1"/>
                   </a:solidFill>
@@ -23152,7 +22882,7 @@
           </p:nvSpPr>
           <p:spPr>
             <a:xfrm>
-              <a:off x="8586258" y="3237834"/>
+              <a:off x="3787425" y="3456000"/>
               <a:ext cx="360000" cy="360000"/>
             </a:xfrm>
             <a:prstGeom prst="donut">
@@ -23214,7 +22944,7 @@
           </p:nvSpPr>
           <p:spPr>
             <a:xfrm rot="5400000">
-              <a:off x="8782799" y="2600310"/>
+              <a:off x="3983966" y="2818476"/>
               <a:ext cx="648000" cy="612000"/>
             </a:xfrm>
             <a:prstGeom prst="hexagon">
@@ -23270,7 +23000,7 @@
           </p:nvCxnSpPr>
           <p:spPr>
             <a:xfrm>
-              <a:off x="9451529" y="2906447"/>
+              <a:off x="4652696" y="3124613"/>
               <a:ext cx="281448" cy="7387"/>
             </a:xfrm>
             <a:prstGeom prst="straightConnector1">
@@ -23312,7 +23042,7 @@
           </p:nvSpPr>
           <p:spPr>
             <a:xfrm rot="5400000">
-              <a:off x="9726634" y="2607834"/>
+              <a:off x="4927801" y="2826000"/>
               <a:ext cx="648000" cy="612000"/>
             </a:xfrm>
             <a:prstGeom prst="hexagon">
@@ -23366,7 +23096,7 @@
           </p:nvSpPr>
           <p:spPr>
             <a:xfrm>
-              <a:off x="9001293" y="2726310"/>
+              <a:off x="4202460" y="2944476"/>
               <a:ext cx="180000" cy="360000"/>
             </a:xfrm>
             <a:prstGeom prst="rect">
@@ -23421,7 +23151,7 @@
           </p:nvSpPr>
           <p:spPr>
             <a:xfrm>
-              <a:off x="9960634" y="2699089"/>
+              <a:off x="5161801" y="2917255"/>
               <a:ext cx="180000" cy="180000"/>
             </a:xfrm>
             <a:prstGeom prst="ellipse">
@@ -23476,7 +23206,7 @@
           </p:nvSpPr>
           <p:spPr>
             <a:xfrm>
-              <a:off x="10099962" y="2906447"/>
+              <a:off x="5301129" y="3124613"/>
               <a:ext cx="180000" cy="180000"/>
             </a:xfrm>
             <a:prstGeom prst="ellipse">
@@ -23531,7 +23261,7 @@
           </p:nvSpPr>
           <p:spPr>
             <a:xfrm>
-              <a:off x="9826799" y="2906447"/>
+              <a:off x="5027966" y="3124613"/>
               <a:ext cx="180000" cy="180000"/>
             </a:xfrm>
             <a:prstGeom prst="ellipse">
@@ -23586,7 +23316,7 @@
           </p:nvSpPr>
           <p:spPr>
             <a:xfrm>
-              <a:off x="8702017" y="997974"/>
+              <a:off x="3903184" y="1216140"/>
               <a:ext cx="1716417" cy="1015663"/>
             </a:xfrm>
             <a:prstGeom prst="rect">
@@ -23627,7 +23357,7 @@
           </p:nvSpPr>
           <p:spPr>
             <a:xfrm>
-              <a:off x="8702017" y="1999272"/>
+              <a:off x="3903184" y="2217438"/>
               <a:ext cx="1304782" cy="461665"/>
             </a:xfrm>
             <a:prstGeom prst="rect">
@@ -24286,6 +24016,36 @@
     <p:extLst>
       <p:ext uri="{BB962C8B-B14F-4D97-AF65-F5344CB8AC3E}">
         <p14:creationId xmlns:p14="http://schemas.microsoft.com/office/powerpoint/2010/main" val="1294037286"/>
+      </p:ext>
+    </p:extLst>
+  </p:cSld>
+  <p:clrMapOvr>
+    <a:masterClrMapping/>
+  </p:clrMapOvr>
+</p:sld>
+</file>
+
+<file path=ppt/slides/slide9.xml><?xml version="1.0" encoding="utf-8"?>
+<p:sld xmlns:a="http://schemas.openxmlformats.org/drawingml/2006/main" xmlns:r="http://schemas.openxmlformats.org/officeDocument/2006/relationships" xmlns:p="http://schemas.openxmlformats.org/presentationml/2006/main">
+  <p:cSld>
+    <p:spTree>
+      <p:nvGrpSpPr>
+        <p:cNvPr id="1" name=""/>
+        <p:cNvGrpSpPr/>
+        <p:nvPr/>
+      </p:nvGrpSpPr>
+      <p:grpSpPr>
+        <a:xfrm>
+          <a:off x="0" y="0"/>
+          <a:ext cx="0" cy="0"/>
+          <a:chOff x="0" y="0"/>
+          <a:chExt cx="0" cy="0"/>
+        </a:xfrm>
+      </p:grpSpPr>
+    </p:spTree>
+    <p:extLst>
+      <p:ext uri="{BB962C8B-B14F-4D97-AF65-F5344CB8AC3E}">
+        <p14:creationId xmlns:p14="http://schemas.microsoft.com/office/powerpoint/2010/main" val="3126713340"/>
       </p:ext>
     </p:extLst>
   </p:cSld>

</xml_diff>

<commit_message>
Renforcer le contraste du bandeau des cartes ordres
</commit_message>
<xml_diff>
--- a/pictures/cartes-a-jouer.pptx
+++ b/pictures/cartes-a-jouer.pptx
@@ -5,7 +5,7 @@
     <p:sldMasterId id="2147483648" r:id="rId1"/>
   </p:sldMasterIdLst>
   <p:notesMasterIdLst>
-    <p:notesMasterId r:id="rId11"/>
+    <p:notesMasterId r:id="rId10"/>
   </p:notesMasterIdLst>
   <p:sldIdLst>
     <p:sldId id="256" r:id="rId2"/>
@@ -16,7 +16,6 @@
     <p:sldId id="262" r:id="rId7"/>
     <p:sldId id="263" r:id="rId8"/>
     <p:sldId id="264" r:id="rId9"/>
-    <p:sldId id="265" r:id="rId10"/>
   </p:sldIdLst>
   <p:sldSz cx="12192000" cy="6858000"/>
   <p:notesSz cx="6888163" cy="10020300"/>
@@ -205,7 +204,7 @@
           <a:p>
             <a:fld id="{263B0988-6DB9-4E3D-B7FD-EFF3BCABE954}" type="datetimeFigureOut">
               <a:rPr lang="fr-FR" smtClean="0"/>
-              <a:t>09/02/2026</a:t>
+              <a:t>10/02/2026</a:t>
             </a:fld>
             <a:endParaRPr lang="fr-FR"/>
           </a:p>
@@ -703,7 +702,7 @@
           <a:p>
             <a:fld id="{588505E2-0C4C-443F-8F57-41958F504CA2}" type="datetimeFigureOut">
               <a:rPr lang="fr-FR" smtClean="0"/>
-              <a:t>09/02/2026</a:t>
+              <a:t>10/02/2026</a:t>
             </a:fld>
             <a:endParaRPr lang="fr-FR"/>
           </a:p>
@@ -901,7 +900,7 @@
           <a:p>
             <a:fld id="{588505E2-0C4C-443F-8F57-41958F504CA2}" type="datetimeFigureOut">
               <a:rPr lang="fr-FR" smtClean="0"/>
-              <a:t>09/02/2026</a:t>
+              <a:t>10/02/2026</a:t>
             </a:fld>
             <a:endParaRPr lang="fr-FR"/>
           </a:p>
@@ -1109,7 +1108,7 @@
           <a:p>
             <a:fld id="{588505E2-0C4C-443F-8F57-41958F504CA2}" type="datetimeFigureOut">
               <a:rPr lang="fr-FR" smtClean="0"/>
-              <a:t>09/02/2026</a:t>
+              <a:t>10/02/2026</a:t>
             </a:fld>
             <a:endParaRPr lang="fr-FR"/>
           </a:p>
@@ -1307,7 +1306,7 @@
           <a:p>
             <a:fld id="{588505E2-0C4C-443F-8F57-41958F504CA2}" type="datetimeFigureOut">
               <a:rPr lang="fr-FR" smtClean="0"/>
-              <a:t>09/02/2026</a:t>
+              <a:t>10/02/2026</a:t>
             </a:fld>
             <a:endParaRPr lang="fr-FR"/>
           </a:p>
@@ -1582,7 +1581,7 @@
           <a:p>
             <a:fld id="{588505E2-0C4C-443F-8F57-41958F504CA2}" type="datetimeFigureOut">
               <a:rPr lang="fr-FR" smtClean="0"/>
-              <a:t>09/02/2026</a:t>
+              <a:t>10/02/2026</a:t>
             </a:fld>
             <a:endParaRPr lang="fr-FR"/>
           </a:p>
@@ -1847,7 +1846,7 @@
           <a:p>
             <a:fld id="{588505E2-0C4C-443F-8F57-41958F504CA2}" type="datetimeFigureOut">
               <a:rPr lang="fr-FR" smtClean="0"/>
-              <a:t>09/02/2026</a:t>
+              <a:t>10/02/2026</a:t>
             </a:fld>
             <a:endParaRPr lang="fr-FR"/>
           </a:p>
@@ -2259,7 +2258,7 @@
           <a:p>
             <a:fld id="{588505E2-0C4C-443F-8F57-41958F504CA2}" type="datetimeFigureOut">
               <a:rPr lang="fr-FR" smtClean="0"/>
-              <a:t>09/02/2026</a:t>
+              <a:t>10/02/2026</a:t>
             </a:fld>
             <a:endParaRPr lang="fr-FR"/>
           </a:p>
@@ -2400,7 +2399,7 @@
           <a:p>
             <a:fld id="{588505E2-0C4C-443F-8F57-41958F504CA2}" type="datetimeFigureOut">
               <a:rPr lang="fr-FR" smtClean="0"/>
-              <a:t>09/02/2026</a:t>
+              <a:t>10/02/2026</a:t>
             </a:fld>
             <a:endParaRPr lang="fr-FR"/>
           </a:p>
@@ -2513,7 +2512,7 @@
           <a:p>
             <a:fld id="{588505E2-0C4C-443F-8F57-41958F504CA2}" type="datetimeFigureOut">
               <a:rPr lang="fr-FR" smtClean="0"/>
-              <a:t>09/02/2026</a:t>
+              <a:t>10/02/2026</a:t>
             </a:fld>
             <a:endParaRPr lang="fr-FR"/>
           </a:p>
@@ -2824,7 +2823,7 @@
           <a:p>
             <a:fld id="{588505E2-0C4C-443F-8F57-41958F504CA2}" type="datetimeFigureOut">
               <a:rPr lang="fr-FR" smtClean="0"/>
-              <a:t>09/02/2026</a:t>
+              <a:t>10/02/2026</a:t>
             </a:fld>
             <a:endParaRPr lang="fr-FR"/>
           </a:p>
@@ -3112,7 +3111,7 @@
           <a:p>
             <a:fld id="{588505E2-0C4C-443F-8F57-41958F504CA2}" type="datetimeFigureOut">
               <a:rPr lang="fr-FR" smtClean="0"/>
-              <a:t>09/02/2026</a:t>
+              <a:t>10/02/2026</a:t>
             </a:fld>
             <a:endParaRPr lang="fr-FR"/>
           </a:p>
@@ -3353,7 +3352,7 @@
           <a:p>
             <a:fld id="{588505E2-0C4C-443F-8F57-41958F504CA2}" type="datetimeFigureOut">
               <a:rPr lang="fr-FR" smtClean="0"/>
-              <a:t>09/02/2026</a:t>
+              <a:t>10/02/2026</a:t>
             </a:fld>
             <a:endParaRPr lang="fr-FR"/>
           </a:p>
@@ -18620,10 +18619,10 @@
       </p:sp>
       <p:grpSp>
         <p:nvGrpSpPr>
-          <p:cNvPr id="20" name="Groupe 19">
-            <a:extLst>
-              <a:ext uri="{FF2B5EF4-FFF2-40B4-BE49-F238E27FC236}">
-                <a16:creationId xmlns:a16="http://schemas.microsoft.com/office/drawing/2014/main" id="{A452A156-047C-A7F2-166D-D88053FDAF80}"/>
+          <p:cNvPr id="24" name="Groupe 23">
+            <a:extLst>
+              <a:ext uri="{FF2B5EF4-FFF2-40B4-BE49-F238E27FC236}">
+                <a16:creationId xmlns:a16="http://schemas.microsoft.com/office/drawing/2014/main" id="{F46721F6-3E77-2BD7-9485-8A02069410BD}"/>
               </a:ext>
             </a:extLst>
           </p:cNvPr>
@@ -18634,7 +18633,7 @@
           <a:xfrm>
             <a:off x="8735287" y="557331"/>
             <a:ext cx="2124000" cy="3312000"/>
-            <a:chOff x="8535262" y="624006"/>
+            <a:chOff x="8735287" y="557331"/>
             <a:chExt cx="2124000" cy="3312000"/>
           </a:xfrm>
         </p:grpSpPr>
@@ -18652,7 +18651,7 @@
           </p:nvSpPr>
           <p:spPr>
             <a:xfrm>
-              <a:off x="8535262" y="624006"/>
+              <a:off x="8735287" y="557331"/>
               <a:ext cx="2124000" cy="3312000"/>
             </a:xfrm>
             <a:prstGeom prst="rect">
@@ -18705,7 +18704,7 @@
           </p:nvSpPr>
           <p:spPr>
             <a:xfrm>
-              <a:off x="8535262" y="624006"/>
+              <a:off x="8735287" y="557331"/>
               <a:ext cx="2124000" cy="432000"/>
             </a:xfrm>
             <a:prstGeom prst="rect">
@@ -18720,6 +18719,9 @@
                       <a14:imgLayer r:embed="rId4">
                         <a14:imgEffect>
                           <a14:artisticWatercolorSponge/>
+                        </a14:imgEffect>
+                        <a14:imgEffect>
+                          <a14:brightnessContrast bright="-40000" contrast="20000"/>
                         </a14:imgEffect>
                       </a14:imgLayer>
                     </a14:imgProps>
@@ -18783,7 +18785,7 @@
           </p:nvSpPr>
           <p:spPr>
             <a:xfrm>
-              <a:off x="8614235" y="3497623"/>
+              <a:off x="8814260" y="3430948"/>
               <a:ext cx="360000" cy="360000"/>
             </a:xfrm>
             <a:prstGeom prst="donut">
@@ -18845,7 +18847,7 @@
           </p:nvSpPr>
           <p:spPr>
             <a:xfrm rot="5400000">
-              <a:off x="9697808" y="2872199"/>
+              <a:off x="9897833" y="2805524"/>
               <a:ext cx="396000" cy="360000"/>
             </a:xfrm>
             <a:prstGeom prst="hexagon">
@@ -18899,7 +18901,7 @@
           </p:nvSpPr>
           <p:spPr>
             <a:xfrm>
-              <a:off x="9008117" y="2872199"/>
+              <a:off x="9208142" y="2805524"/>
               <a:ext cx="360000" cy="360000"/>
             </a:xfrm>
             <a:prstGeom prst="ellipse">
@@ -18956,7 +18958,7 @@
           </p:nvCxnSpPr>
           <p:spPr>
             <a:xfrm>
-              <a:off x="9410378" y="3052199"/>
+              <a:off x="9610403" y="2985524"/>
               <a:ext cx="568633" cy="0"/>
             </a:xfrm>
             <a:prstGeom prst="straightConnector1">
@@ -18995,7 +18997,7 @@
           </p:nvSpPr>
           <p:spPr>
             <a:xfrm>
-              <a:off x="8624555" y="1194970"/>
+              <a:off x="8824580" y="1128295"/>
               <a:ext cx="1944120" cy="461665"/>
             </a:xfrm>
             <a:prstGeom prst="rect">
@@ -19036,7 +19038,7 @@
           </p:nvSpPr>
           <p:spPr>
             <a:xfrm>
-              <a:off x="8624555" y="1735812"/>
+              <a:off x="8824580" y="1669137"/>
               <a:ext cx="1296933" cy="461665"/>
             </a:xfrm>
             <a:prstGeom prst="rect">
@@ -19066,10 +19068,10 @@
       </p:grpSp>
       <p:grpSp>
         <p:nvGrpSpPr>
-          <p:cNvPr id="8" name="Groupe 7">
-            <a:extLst>
-              <a:ext uri="{FF2B5EF4-FFF2-40B4-BE49-F238E27FC236}">
-                <a16:creationId xmlns:a16="http://schemas.microsoft.com/office/drawing/2014/main" id="{4A4C7D7F-D05E-3879-549B-77665B977663}"/>
+          <p:cNvPr id="21" name="Groupe 20">
+            <a:extLst>
+              <a:ext uri="{FF2B5EF4-FFF2-40B4-BE49-F238E27FC236}">
+                <a16:creationId xmlns:a16="http://schemas.microsoft.com/office/drawing/2014/main" id="{EB0D8F05-81CD-13E0-6979-7DC2331D1F9F}"/>
               </a:ext>
             </a:extLst>
           </p:cNvPr>
@@ -19080,7 +19082,7 @@
           <a:xfrm>
             <a:off x="908619" y="557331"/>
             <a:ext cx="2124000" cy="3312000"/>
-            <a:chOff x="708594" y="663334"/>
+            <a:chOff x="908619" y="557331"/>
             <a:chExt cx="2124000" cy="3312000"/>
           </a:xfrm>
         </p:grpSpPr>
@@ -19098,7 +19100,7 @@
           </p:nvSpPr>
           <p:spPr>
             <a:xfrm>
-              <a:off x="708594" y="663334"/>
+              <a:off x="908619" y="557331"/>
               <a:ext cx="2124000" cy="3312000"/>
             </a:xfrm>
             <a:prstGeom prst="rect">
@@ -19151,7 +19153,7 @@
           </p:nvSpPr>
           <p:spPr>
             <a:xfrm>
-              <a:off x="708594" y="663334"/>
+              <a:off x="908619" y="557331"/>
               <a:ext cx="2124000" cy="432000"/>
             </a:xfrm>
             <a:prstGeom prst="rect">
@@ -19166,6 +19168,9 @@
                       <a14:imgLayer r:embed="rId4">
                         <a14:imgEffect>
                           <a14:artisticWatercolorSponge/>
+                        </a14:imgEffect>
+                        <a14:imgEffect>
+                          <a14:brightnessContrast bright="-40000" contrast="20000"/>
                         </a14:imgEffect>
                       </a14:imgLayer>
                     </a14:imgProps>
@@ -19229,7 +19234,7 @@
           </p:nvSpPr>
           <p:spPr>
             <a:xfrm>
-              <a:off x="816757" y="3530837"/>
+              <a:off x="1016782" y="3424834"/>
               <a:ext cx="360000" cy="360000"/>
             </a:xfrm>
             <a:prstGeom prst="donut">
@@ -19291,7 +19296,7 @@
           </p:nvSpPr>
           <p:spPr>
             <a:xfrm>
-              <a:off x="1245723" y="3512199"/>
+              <a:off x="1445748" y="3406196"/>
               <a:ext cx="645894" cy="369332"/>
             </a:xfrm>
             <a:prstGeom prst="rect">
@@ -19332,7 +19337,7 @@
           </p:nvSpPr>
           <p:spPr>
             <a:xfrm>
-              <a:off x="1765617" y="3589757"/>
+              <a:off x="1965642" y="3483754"/>
               <a:ext cx="252000" cy="252000"/>
             </a:xfrm>
             <a:prstGeom prst="mathPlus">
@@ -19384,7 +19389,7 @@
           </p:nvSpPr>
           <p:spPr>
             <a:xfrm rot="5400000">
-              <a:off x="2287377" y="2948439"/>
+              <a:off x="2487402" y="2842436"/>
               <a:ext cx="396000" cy="360000"/>
             </a:xfrm>
             <a:prstGeom prst="hexagon">
@@ -19438,7 +19443,7 @@
           </p:nvSpPr>
           <p:spPr>
             <a:xfrm>
-              <a:off x="868540" y="2948439"/>
+              <a:off x="1068565" y="2842436"/>
               <a:ext cx="360000" cy="360000"/>
             </a:xfrm>
             <a:prstGeom prst="ellipse">
@@ -19493,7 +19498,7 @@
           </p:nvSpPr>
           <p:spPr>
             <a:xfrm>
-              <a:off x="1234866" y="2948439"/>
+              <a:off x="1434891" y="2842436"/>
               <a:ext cx="360000" cy="360000"/>
             </a:xfrm>
             <a:prstGeom prst="ellipse">
@@ -19548,7 +19553,7 @@
           </p:nvSpPr>
           <p:spPr>
             <a:xfrm>
-              <a:off x="1597686" y="2948439"/>
+              <a:off x="1797711" y="2842436"/>
               <a:ext cx="360000" cy="360000"/>
             </a:xfrm>
             <a:prstGeom prst="ellipse">
@@ -19603,7 +19608,7 @@
           </p:nvSpPr>
           <p:spPr>
             <a:xfrm>
-              <a:off x="2059126" y="3535757"/>
+              <a:off x="2259151" y="3429754"/>
               <a:ext cx="360000" cy="360000"/>
             </a:xfrm>
             <a:prstGeom prst="ellipse">
@@ -19660,7 +19665,7 @@
           </p:nvCxnSpPr>
           <p:spPr>
             <a:xfrm>
-              <a:off x="1999947" y="3128439"/>
+              <a:off x="2199972" y="3022436"/>
               <a:ext cx="568633" cy="0"/>
             </a:xfrm>
             <a:prstGeom prst="straightConnector1">
@@ -19699,7 +19704,7 @@
           </p:nvSpPr>
           <p:spPr>
             <a:xfrm>
-              <a:off x="789250" y="1191175"/>
+              <a:off x="989275" y="1085172"/>
               <a:ext cx="1944120" cy="646331"/>
             </a:xfrm>
             <a:prstGeom prst="rect">
@@ -19740,7 +19745,7 @@
           </p:nvSpPr>
           <p:spPr>
             <a:xfrm>
-              <a:off x="816757" y="1868079"/>
+              <a:off x="1016782" y="1762076"/>
               <a:ext cx="1944120" cy="461665"/>
             </a:xfrm>
             <a:prstGeom prst="rect">
@@ -19781,7 +19786,7 @@
           </p:nvSpPr>
           <p:spPr>
             <a:xfrm>
-              <a:off x="803670" y="2363806"/>
+              <a:off x="1003695" y="2257803"/>
               <a:ext cx="1296933" cy="461665"/>
             </a:xfrm>
             <a:prstGeom prst="rect">
@@ -19811,10 +19816,10 @@
       </p:grpSp>
       <p:grpSp>
         <p:nvGrpSpPr>
-          <p:cNvPr id="9" name="Groupe 8">
-            <a:extLst>
-              <a:ext uri="{FF2B5EF4-FFF2-40B4-BE49-F238E27FC236}">
-                <a16:creationId xmlns:a16="http://schemas.microsoft.com/office/drawing/2014/main" id="{00BC3939-4057-676D-5471-7516812241E8}"/>
+          <p:cNvPr id="22" name="Groupe 21">
+            <a:extLst>
+              <a:ext uri="{FF2B5EF4-FFF2-40B4-BE49-F238E27FC236}">
+                <a16:creationId xmlns:a16="http://schemas.microsoft.com/office/drawing/2014/main" id="{509553E3-0B9E-D5AB-571A-B87B78DAA342}"/>
               </a:ext>
             </a:extLst>
           </p:cNvPr>
@@ -19825,7 +19830,7 @@
           <a:xfrm>
             <a:off x="3517508" y="557331"/>
             <a:ext cx="2124000" cy="3312000"/>
-            <a:chOff x="3241118" y="624006"/>
+            <a:chOff x="3517508" y="557331"/>
             <a:chExt cx="2124000" cy="3312000"/>
           </a:xfrm>
         </p:grpSpPr>
@@ -19843,7 +19848,7 @@
           </p:nvSpPr>
           <p:spPr>
             <a:xfrm>
-              <a:off x="3241118" y="624006"/>
+              <a:off x="3517508" y="557331"/>
               <a:ext cx="2124000" cy="3312000"/>
             </a:xfrm>
             <a:prstGeom prst="rect">
@@ -19896,7 +19901,7 @@
           </p:nvSpPr>
           <p:spPr>
             <a:xfrm>
-              <a:off x="3241118" y="624006"/>
+              <a:off x="3517508" y="557331"/>
               <a:ext cx="2124000" cy="432000"/>
             </a:xfrm>
             <a:prstGeom prst="rect">
@@ -19911,6 +19916,9 @@
                       <a14:imgLayer r:embed="rId4">
                         <a14:imgEffect>
                           <a14:artisticWatercolorSponge/>
+                        </a14:imgEffect>
+                        <a14:imgEffect>
+                          <a14:brightnessContrast bright="-40000" contrast="20000"/>
                         </a14:imgEffect>
                       </a14:imgLayer>
                     </a14:imgProps>
@@ -19974,7 +19982,7 @@
           </p:nvSpPr>
           <p:spPr>
             <a:xfrm>
-              <a:off x="3353498" y="3471845"/>
+              <a:off x="3629888" y="3405170"/>
               <a:ext cx="360000" cy="360000"/>
             </a:xfrm>
             <a:prstGeom prst="donut">
@@ -20036,7 +20044,7 @@
           </p:nvSpPr>
           <p:spPr>
             <a:xfrm>
-              <a:off x="3782464" y="3453207"/>
+              <a:off x="4058854" y="3386532"/>
               <a:ext cx="645894" cy="369332"/>
             </a:xfrm>
             <a:prstGeom prst="rect">
@@ -20077,7 +20085,7 @@
           </p:nvSpPr>
           <p:spPr>
             <a:xfrm>
-              <a:off x="4302358" y="3530765"/>
+              <a:off x="4578748" y="3464090"/>
               <a:ext cx="252000" cy="252000"/>
             </a:xfrm>
             <a:prstGeom prst="mathPlus">
@@ -20129,7 +20137,7 @@
           </p:nvSpPr>
           <p:spPr>
             <a:xfrm rot="5400000">
-              <a:off x="4615845" y="2889217"/>
+              <a:off x="4892235" y="2822542"/>
               <a:ext cx="396000" cy="360000"/>
             </a:xfrm>
             <a:prstGeom prst="hexagon">
@@ -20183,7 +20191,7 @@
           </p:nvSpPr>
           <p:spPr>
             <a:xfrm>
-              <a:off x="3563334" y="2889217"/>
+              <a:off x="3839724" y="2822542"/>
               <a:ext cx="360000" cy="360000"/>
             </a:xfrm>
             <a:prstGeom prst="ellipse">
@@ -20238,7 +20246,7 @@
           </p:nvSpPr>
           <p:spPr>
             <a:xfrm>
-              <a:off x="3926154" y="2889217"/>
+              <a:off x="4202544" y="2822542"/>
               <a:ext cx="360000" cy="360000"/>
             </a:xfrm>
             <a:prstGeom prst="ellipse">
@@ -20293,7 +20301,7 @@
           </p:nvSpPr>
           <p:spPr>
             <a:xfrm>
-              <a:off x="4595867" y="3476765"/>
+              <a:off x="4872257" y="3410090"/>
               <a:ext cx="360000" cy="360000"/>
             </a:xfrm>
             <a:prstGeom prst="ellipse">
@@ -20350,7 +20358,7 @@
           </p:nvCxnSpPr>
           <p:spPr>
             <a:xfrm>
-              <a:off x="4328415" y="3069217"/>
+              <a:off x="4604805" y="3002542"/>
               <a:ext cx="568633" cy="0"/>
             </a:xfrm>
             <a:prstGeom prst="straightConnector1">
@@ -20389,7 +20397,7 @@
           </p:nvSpPr>
           <p:spPr>
             <a:xfrm>
-              <a:off x="3325991" y="1132183"/>
+              <a:off x="3602381" y="1065508"/>
               <a:ext cx="1944120" cy="646331"/>
             </a:xfrm>
             <a:prstGeom prst="rect">
@@ -20430,7 +20438,7 @@
           </p:nvSpPr>
           <p:spPr>
             <a:xfrm>
-              <a:off x="3353498" y="1809087"/>
+              <a:off x="3629888" y="1742412"/>
               <a:ext cx="1944120" cy="461665"/>
             </a:xfrm>
             <a:prstGeom prst="rect">
@@ -20471,7 +20479,7 @@
           </p:nvSpPr>
           <p:spPr>
             <a:xfrm>
-              <a:off x="3369723" y="2348310"/>
+              <a:off x="3646113" y="2281635"/>
               <a:ext cx="1296933" cy="461665"/>
             </a:xfrm>
             <a:prstGeom prst="rect">
@@ -20501,10 +20509,10 @@
       </p:grpSp>
       <p:grpSp>
         <p:nvGrpSpPr>
-          <p:cNvPr id="10" name="Groupe 9">
-            <a:extLst>
-              <a:ext uri="{FF2B5EF4-FFF2-40B4-BE49-F238E27FC236}">
-                <a16:creationId xmlns:a16="http://schemas.microsoft.com/office/drawing/2014/main" id="{87B79EA7-ABCE-7FE0-573E-AEF7318917A4}"/>
+          <p:cNvPr id="23" name="Groupe 22">
+            <a:extLst>
+              <a:ext uri="{FF2B5EF4-FFF2-40B4-BE49-F238E27FC236}">
+                <a16:creationId xmlns:a16="http://schemas.microsoft.com/office/drawing/2014/main" id="{E029D241-7CF5-CDE3-7C86-D52A92AD9D2A}"/>
               </a:ext>
             </a:extLst>
           </p:cNvPr>
@@ -20515,7 +20523,7 @@
           <a:xfrm>
             <a:off x="6126397" y="557331"/>
             <a:ext cx="2124000" cy="3312000"/>
-            <a:chOff x="5870563" y="624006"/>
+            <a:chOff x="6126397" y="557331"/>
             <a:chExt cx="2124000" cy="3312000"/>
           </a:xfrm>
         </p:grpSpPr>
@@ -20533,7 +20541,7 @@
           </p:nvSpPr>
           <p:spPr>
             <a:xfrm>
-              <a:off x="5870563" y="624006"/>
+              <a:off x="6126397" y="557331"/>
               <a:ext cx="2124000" cy="3312000"/>
             </a:xfrm>
             <a:prstGeom prst="rect">
@@ -20586,7 +20594,7 @@
           </p:nvSpPr>
           <p:spPr>
             <a:xfrm>
-              <a:off x="5870563" y="624006"/>
+              <a:off x="6126397" y="557331"/>
               <a:ext cx="2124000" cy="432000"/>
             </a:xfrm>
             <a:prstGeom prst="rect">
@@ -20601,6 +20609,9 @@
                       <a14:imgLayer r:embed="rId4">
                         <a14:imgEffect>
                           <a14:artisticWatercolorSponge/>
+                        </a14:imgEffect>
+                        <a14:imgEffect>
+                          <a14:brightnessContrast bright="-40000" contrast="20000"/>
                         </a14:imgEffect>
                       </a14:imgLayer>
                     </a14:imgProps>
@@ -20664,7 +20675,7 @@
           </p:nvSpPr>
           <p:spPr>
             <a:xfrm>
-              <a:off x="5982943" y="3462670"/>
+              <a:off x="6238777" y="3395995"/>
               <a:ext cx="360000" cy="360000"/>
             </a:xfrm>
             <a:prstGeom prst="donut">
@@ -20726,7 +20737,7 @@
           </p:nvSpPr>
           <p:spPr>
             <a:xfrm>
-              <a:off x="6411909" y="3444032"/>
+              <a:off x="6667743" y="3377357"/>
               <a:ext cx="645894" cy="369332"/>
             </a:xfrm>
             <a:prstGeom prst="rect">
@@ -20767,7 +20778,7 @@
           </p:nvSpPr>
           <p:spPr>
             <a:xfrm>
-              <a:off x="6931803" y="3521590"/>
+              <a:off x="7187637" y="3454915"/>
               <a:ext cx="252000" cy="252000"/>
             </a:xfrm>
             <a:prstGeom prst="mathPlus">
@@ -20819,7 +20830,7 @@
           </p:nvSpPr>
           <p:spPr>
             <a:xfrm rot="5400000">
-              <a:off x="7046117" y="2852867"/>
+              <a:off x="7301951" y="2786192"/>
               <a:ext cx="396000" cy="360000"/>
             </a:xfrm>
             <a:prstGeom prst="hexagon">
@@ -20873,7 +20884,7 @@
           </p:nvSpPr>
           <p:spPr>
             <a:xfrm>
-              <a:off x="6356426" y="2852867"/>
+              <a:off x="6612260" y="2786192"/>
               <a:ext cx="360000" cy="360000"/>
             </a:xfrm>
             <a:prstGeom prst="ellipse">
@@ -20928,7 +20939,7 @@
           </p:nvSpPr>
           <p:spPr>
             <a:xfrm>
-              <a:off x="7225312" y="3467590"/>
+              <a:off x="7481146" y="3400915"/>
               <a:ext cx="360000" cy="360000"/>
             </a:xfrm>
             <a:prstGeom prst="ellipse">
@@ -20985,7 +20996,7 @@
           </p:nvCxnSpPr>
           <p:spPr>
             <a:xfrm>
-              <a:off x="6758687" y="3032867"/>
+              <a:off x="7014521" y="2966192"/>
               <a:ext cx="568633" cy="0"/>
             </a:xfrm>
             <a:prstGeom prst="straightConnector1">
@@ -21024,7 +21035,7 @@
           </p:nvSpPr>
           <p:spPr>
             <a:xfrm>
-              <a:off x="5955436" y="1123008"/>
+              <a:off x="6211270" y="1056333"/>
               <a:ext cx="1944120" cy="461665"/>
             </a:xfrm>
             <a:prstGeom prst="rect">
@@ -21065,7 +21076,7 @@
           </p:nvSpPr>
           <p:spPr>
             <a:xfrm>
-              <a:off x="5982943" y="1799912"/>
+              <a:off x="6238777" y="1733237"/>
               <a:ext cx="1944120" cy="461665"/>
             </a:xfrm>
             <a:prstGeom prst="rect">
@@ -21106,7 +21117,7 @@
           </p:nvSpPr>
           <p:spPr>
             <a:xfrm>
-              <a:off x="5982943" y="2353723"/>
+              <a:off x="6238777" y="2287048"/>
               <a:ext cx="1296933" cy="461665"/>
             </a:xfrm>
             <a:prstGeom prst="rect">
@@ -21333,6 +21344,9 @@
                       <a14:imgLayer r:embed="rId5">
                         <a14:imgEffect>
                           <a14:artisticWatercolorSponge/>
+                        </a14:imgEffect>
+                        <a14:imgEffect>
+                          <a14:brightnessContrast bright="-40000" contrast="20000"/>
                         </a14:imgEffect>
                       </a14:imgLayer>
                     </a14:imgProps>
@@ -22062,6 +22076,9 @@
                       <a14:imgLayer r:embed="rId5">
                         <a14:imgEffect>
                           <a14:artisticWatercolorSponge/>
+                        </a14:imgEffect>
+                        <a14:imgEffect>
+                          <a14:brightnessContrast bright="-40000" contrast="20000"/>
                         </a14:imgEffect>
                       </a14:imgLayer>
                     </a14:imgProps>
@@ -22820,6 +22837,9 @@
                         <a14:imgEffect>
                           <a14:artisticWatercolorSponge/>
                         </a14:imgEffect>
+                        <a14:imgEffect>
+                          <a14:brightnessContrast bright="-40000" contrast="20000"/>
+                        </a14:imgEffect>
                       </a14:imgLayer>
                     </a14:imgProps>
                   </a:ext>
@@ -23488,6 +23508,9 @@
                         <a14:imgEffect>
                           <a14:artisticWatercolorSponge/>
                         </a14:imgEffect>
+                        <a14:imgEffect>
+                          <a14:brightnessContrast bright="-40000" contrast="20000"/>
+                        </a14:imgEffect>
                       </a14:imgLayer>
                     </a14:imgProps>
                   </a:ext>
@@ -24016,36 +24039,6 @@
     <p:extLst>
       <p:ext uri="{BB962C8B-B14F-4D97-AF65-F5344CB8AC3E}">
         <p14:creationId xmlns:p14="http://schemas.microsoft.com/office/powerpoint/2010/main" val="1294037286"/>
-      </p:ext>
-    </p:extLst>
-  </p:cSld>
-  <p:clrMapOvr>
-    <a:masterClrMapping/>
-  </p:clrMapOvr>
-</p:sld>
-</file>
-
-<file path=ppt/slides/slide9.xml><?xml version="1.0" encoding="utf-8"?>
-<p:sld xmlns:a="http://schemas.openxmlformats.org/drawingml/2006/main" xmlns:r="http://schemas.openxmlformats.org/officeDocument/2006/relationships" xmlns:p="http://schemas.openxmlformats.org/presentationml/2006/main">
-  <p:cSld>
-    <p:spTree>
-      <p:nvGrpSpPr>
-        <p:cNvPr id="1" name=""/>
-        <p:cNvGrpSpPr/>
-        <p:nvPr/>
-      </p:nvGrpSpPr>
-      <p:grpSpPr>
-        <a:xfrm>
-          <a:off x="0" y="0"/>
-          <a:ext cx="0" cy="0"/>
-          <a:chOff x="0" y="0"/>
-          <a:chExt cx="0" cy="0"/>
-        </a:xfrm>
-      </p:grpSpPr>
-    </p:spTree>
-    <p:extLst>
-      <p:ext uri="{BB962C8B-B14F-4D97-AF65-F5344CB8AC3E}">
-        <p14:creationId xmlns:p14="http://schemas.microsoft.com/office/powerpoint/2010/main" val="3126713340"/>
       </p:ext>
     </p:extLst>
   </p:cSld>

</xml_diff>